<commit_message>
ID18 nano ML heat loads
</commit_message>
<xml_diff>
--- a/BL_layouts.pptx
+++ b/BL_layouts.pptx
@@ -5,7 +5,7 @@
     <p:sldMasterId id="2147483660" r:id="rId1"/>
   </p:sldMasterIdLst>
   <p:notesMasterIdLst>
-    <p:notesMasterId r:id="rId9"/>
+    <p:notesMasterId r:id="rId10"/>
   </p:notesMasterIdLst>
   <p:sldIdLst>
     <p:sldId id="327" r:id="rId2"/>
@@ -15,6 +15,7 @@
     <p:sldId id="289" r:id="rId6"/>
     <p:sldId id="319" r:id="rId7"/>
     <p:sldId id="328" r:id="rId8"/>
+    <p:sldId id="329" r:id="rId9"/>
   </p:sldIdLst>
   <p:sldSz cx="12192000" cy="6858000"/>
   <p:notesSz cx="6858000" cy="9144000"/>
@@ -203,7 +204,7 @@
           <a:p>
             <a:fld id="{89A4E6D6-00D0-4221-BCB0-223727F4B16F}" type="datetimeFigureOut">
               <a:rPr lang="en-US" smtClean="0"/>
-              <a:t>02/04/2025</a:t>
+              <a:t>26/08/2025</a:t>
             </a:fld>
             <a:endParaRPr lang="en-US"/>
           </a:p>
@@ -2314,7 +2315,7 @@
           <a:p>
             <a:fld id="{9566A0DD-F8C0-4127-BBCF-4D61AC97DF11}" type="datetimeFigureOut">
               <a:rPr lang="en-GB" smtClean="0"/>
-              <a:t>02/04/2025</a:t>
+              <a:t>26/08/2025</a:t>
             </a:fld>
             <a:endParaRPr lang="en-GB"/>
           </a:p>
@@ -18268,6 +18269,1334 @@
 </p:sld>
 </file>
 
+<file path=ppt/slides/slide8.xml><?xml version="1.0" encoding="utf-8"?>
+<p:sld xmlns:a="http://schemas.openxmlformats.org/drawingml/2006/main" xmlns:r="http://schemas.openxmlformats.org/officeDocument/2006/relationships" xmlns:p="http://schemas.openxmlformats.org/presentationml/2006/main">
+  <p:cSld>
+    <p:spTree>
+      <p:nvGrpSpPr>
+        <p:cNvPr id="1" name=""/>
+        <p:cNvGrpSpPr/>
+        <p:nvPr/>
+      </p:nvGrpSpPr>
+      <p:grpSpPr>
+        <a:xfrm>
+          <a:off x="0" y="0"/>
+          <a:ext cx="0" cy="0"/>
+          <a:chOff x="0" y="0"/>
+          <a:chExt cx="0" cy="0"/>
+        </a:xfrm>
+      </p:grpSpPr>
+      <p:sp>
+        <p:nvSpPr>
+          <p:cNvPr id="2" name="Title 1"/>
+          <p:cNvSpPr>
+            <a:spLocks noGrp="1"/>
+          </p:cNvSpPr>
+          <p:nvPr>
+            <p:ph type="title"/>
+          </p:nvPr>
+        </p:nvSpPr>
+        <p:spPr/>
+        <p:txBody>
+          <a:bodyPr/>
+          <a:lstStyle/>
+          <a:p>
+            <a:r>
+              <a:rPr lang="en-GB" dirty="0"/>
+              <a:t>ID18 Nano</a:t>
+            </a:r>
+          </a:p>
+        </p:txBody>
+      </p:sp>
+      <p:sp>
+        <p:nvSpPr>
+          <p:cNvPr id="8" name="Cube 7"/>
+          <p:cNvSpPr/>
+          <p:nvPr/>
+        </p:nvSpPr>
+        <p:spPr>
+          <a:xfrm rot="19705693">
+            <a:off x="5046548" y="2371214"/>
+            <a:ext cx="330811" cy="197102"/>
+          </a:xfrm>
+          <a:prstGeom prst="cube">
+            <a:avLst>
+              <a:gd name="adj" fmla="val 10970"/>
+            </a:avLst>
+          </a:prstGeom>
+          <a:solidFill>
+            <a:srgbClr val="FFC000"/>
+          </a:solidFill>
+          <a:ln w="3175">
+            <a:solidFill>
+              <a:schemeClr val="tx1"/>
+            </a:solidFill>
+          </a:ln>
+          <a:scene3d>
+            <a:camera prst="isometricLeftDown"/>
+            <a:lightRig rig="threePt" dir="t"/>
+          </a:scene3d>
+        </p:spPr>
+        <p:style>
+          <a:lnRef idx="2">
+            <a:schemeClr val="accent1">
+              <a:shade val="50000"/>
+            </a:schemeClr>
+          </a:lnRef>
+          <a:fillRef idx="1">
+            <a:schemeClr val="accent1"/>
+          </a:fillRef>
+          <a:effectRef idx="0">
+            <a:schemeClr val="accent1"/>
+          </a:effectRef>
+          <a:fontRef idx="minor">
+            <a:schemeClr val="lt1"/>
+          </a:fontRef>
+        </p:style>
+        <p:txBody>
+          <a:bodyPr rtlCol="0" anchor="ctr"/>
+          <a:lstStyle/>
+          <a:p>
+            <a:pPr algn="ctr"/>
+            <a:endParaRPr lang="en-GB"/>
+          </a:p>
+        </p:txBody>
+      </p:sp>
+      <p:grpSp>
+        <p:nvGrpSpPr>
+          <p:cNvPr id="14" name="Grupo 12"/>
+          <p:cNvGrpSpPr/>
+          <p:nvPr/>
+        </p:nvGrpSpPr>
+        <p:grpSpPr>
+          <a:xfrm>
+            <a:off x="2241710" y="2356978"/>
+            <a:ext cx="478522" cy="113267"/>
+            <a:chOff x="286423" y="1753548"/>
+            <a:chExt cx="1470437" cy="290218"/>
+          </a:xfrm>
+        </p:grpSpPr>
+        <p:sp>
+          <p:nvSpPr>
+            <p:cNvPr id="54" name="Cube 26"/>
+            <p:cNvSpPr/>
+            <p:nvPr/>
+          </p:nvSpPr>
+          <p:spPr>
+            <a:xfrm>
+              <a:off x="286423" y="1753548"/>
+              <a:ext cx="172450" cy="288991"/>
+            </a:xfrm>
+            <a:prstGeom prst="cube">
+              <a:avLst>
+                <a:gd name="adj" fmla="val 15906"/>
+              </a:avLst>
+            </a:prstGeom>
+            <a:solidFill>
+              <a:schemeClr val="accent6"/>
+            </a:solidFill>
+            <a:ln>
+              <a:noFill/>
+            </a:ln>
+          </p:spPr>
+          <p:style>
+            <a:lnRef idx="2">
+              <a:schemeClr val="accent1">
+                <a:shade val="50000"/>
+              </a:schemeClr>
+            </a:lnRef>
+            <a:fillRef idx="1">
+              <a:schemeClr val="accent1"/>
+            </a:fillRef>
+            <a:effectRef idx="0">
+              <a:schemeClr val="accent1"/>
+            </a:effectRef>
+            <a:fontRef idx="minor">
+              <a:schemeClr val="lt1"/>
+            </a:fontRef>
+          </p:style>
+          <p:txBody>
+            <a:bodyPr rtlCol="0" anchor="ctr"/>
+            <a:lstStyle/>
+            <a:p>
+              <a:pPr algn="ctr"/>
+              <a:endParaRPr lang="en-GB" dirty="0"/>
+            </a:p>
+          </p:txBody>
+        </p:sp>
+        <p:sp>
+          <p:nvSpPr>
+            <p:cNvPr id="55" name="Cube 27"/>
+            <p:cNvSpPr/>
+            <p:nvPr/>
+          </p:nvSpPr>
+          <p:spPr>
+            <a:xfrm>
+              <a:off x="431887" y="1754250"/>
+              <a:ext cx="172450" cy="288991"/>
+            </a:xfrm>
+            <a:prstGeom prst="cube">
+              <a:avLst>
+                <a:gd name="adj" fmla="val 15906"/>
+              </a:avLst>
+            </a:prstGeom>
+            <a:solidFill>
+              <a:srgbClr val="FF0000"/>
+            </a:solidFill>
+            <a:ln>
+              <a:noFill/>
+            </a:ln>
+          </p:spPr>
+          <p:style>
+            <a:lnRef idx="2">
+              <a:schemeClr val="accent1">
+                <a:shade val="50000"/>
+              </a:schemeClr>
+            </a:lnRef>
+            <a:fillRef idx="1">
+              <a:schemeClr val="accent1"/>
+            </a:fillRef>
+            <a:effectRef idx="0">
+              <a:schemeClr val="accent1"/>
+            </a:effectRef>
+            <a:fontRef idx="minor">
+              <a:schemeClr val="lt1"/>
+            </a:fontRef>
+          </p:style>
+          <p:txBody>
+            <a:bodyPr rtlCol="0" anchor="ctr"/>
+            <a:lstStyle/>
+            <a:p>
+              <a:pPr algn="ctr"/>
+              <a:endParaRPr lang="en-GB" dirty="0"/>
+            </a:p>
+          </p:txBody>
+        </p:sp>
+        <p:sp>
+          <p:nvSpPr>
+            <p:cNvPr id="56" name="Cube 28"/>
+            <p:cNvSpPr/>
+            <p:nvPr/>
+          </p:nvSpPr>
+          <p:spPr>
+            <a:xfrm>
+              <a:off x="578485" y="1754774"/>
+              <a:ext cx="172450" cy="288991"/>
+            </a:xfrm>
+            <a:prstGeom prst="cube">
+              <a:avLst>
+                <a:gd name="adj" fmla="val 15906"/>
+              </a:avLst>
+            </a:prstGeom>
+            <a:solidFill>
+              <a:schemeClr val="accent6"/>
+            </a:solidFill>
+            <a:ln>
+              <a:noFill/>
+            </a:ln>
+          </p:spPr>
+          <p:style>
+            <a:lnRef idx="2">
+              <a:schemeClr val="accent1">
+                <a:shade val="50000"/>
+              </a:schemeClr>
+            </a:lnRef>
+            <a:fillRef idx="1">
+              <a:schemeClr val="accent1"/>
+            </a:fillRef>
+            <a:effectRef idx="0">
+              <a:schemeClr val="accent1"/>
+            </a:effectRef>
+            <a:fontRef idx="minor">
+              <a:schemeClr val="lt1"/>
+            </a:fontRef>
+          </p:style>
+          <p:txBody>
+            <a:bodyPr rtlCol="0" anchor="ctr"/>
+            <a:lstStyle/>
+            <a:p>
+              <a:pPr algn="ctr"/>
+              <a:endParaRPr lang="en-GB" dirty="0"/>
+            </a:p>
+          </p:txBody>
+        </p:sp>
+        <p:sp>
+          <p:nvSpPr>
+            <p:cNvPr id="57" name="Cube 27"/>
+            <p:cNvSpPr/>
+            <p:nvPr/>
+          </p:nvSpPr>
+          <p:spPr>
+            <a:xfrm>
+              <a:off x="720016" y="1754250"/>
+              <a:ext cx="172450" cy="288991"/>
+            </a:xfrm>
+            <a:prstGeom prst="cube">
+              <a:avLst>
+                <a:gd name="adj" fmla="val 15906"/>
+              </a:avLst>
+            </a:prstGeom>
+            <a:solidFill>
+              <a:srgbClr val="FF0000"/>
+            </a:solidFill>
+            <a:ln>
+              <a:noFill/>
+            </a:ln>
+          </p:spPr>
+          <p:style>
+            <a:lnRef idx="2">
+              <a:schemeClr val="accent1">
+                <a:shade val="50000"/>
+              </a:schemeClr>
+            </a:lnRef>
+            <a:fillRef idx="1">
+              <a:schemeClr val="accent1"/>
+            </a:fillRef>
+            <a:effectRef idx="0">
+              <a:schemeClr val="accent1"/>
+            </a:effectRef>
+            <a:fontRef idx="minor">
+              <a:schemeClr val="lt1"/>
+            </a:fontRef>
+          </p:style>
+          <p:txBody>
+            <a:bodyPr rtlCol="0" anchor="ctr"/>
+            <a:lstStyle/>
+            <a:p>
+              <a:pPr algn="ctr"/>
+              <a:endParaRPr lang="en-GB" dirty="0"/>
+            </a:p>
+          </p:txBody>
+        </p:sp>
+        <p:sp>
+          <p:nvSpPr>
+            <p:cNvPr id="58" name="Cube 28"/>
+            <p:cNvSpPr/>
+            <p:nvPr/>
+          </p:nvSpPr>
+          <p:spPr>
+            <a:xfrm>
+              <a:off x="866614" y="1754774"/>
+              <a:ext cx="172450" cy="288991"/>
+            </a:xfrm>
+            <a:prstGeom prst="cube">
+              <a:avLst>
+                <a:gd name="adj" fmla="val 15906"/>
+              </a:avLst>
+            </a:prstGeom>
+            <a:solidFill>
+              <a:schemeClr val="accent6"/>
+            </a:solidFill>
+            <a:ln>
+              <a:noFill/>
+            </a:ln>
+          </p:spPr>
+          <p:style>
+            <a:lnRef idx="2">
+              <a:schemeClr val="accent1">
+                <a:shade val="50000"/>
+              </a:schemeClr>
+            </a:lnRef>
+            <a:fillRef idx="1">
+              <a:schemeClr val="accent1"/>
+            </a:fillRef>
+            <a:effectRef idx="0">
+              <a:schemeClr val="accent1"/>
+            </a:effectRef>
+            <a:fontRef idx="minor">
+              <a:schemeClr val="lt1"/>
+            </a:fontRef>
+          </p:style>
+          <p:txBody>
+            <a:bodyPr rtlCol="0" anchor="ctr"/>
+            <a:lstStyle/>
+            <a:p>
+              <a:pPr algn="ctr"/>
+              <a:endParaRPr lang="en-GB" dirty="0"/>
+            </a:p>
+          </p:txBody>
+        </p:sp>
+        <p:sp>
+          <p:nvSpPr>
+            <p:cNvPr id="59" name="Cube 27"/>
+            <p:cNvSpPr/>
+            <p:nvPr/>
+          </p:nvSpPr>
+          <p:spPr>
+            <a:xfrm>
+              <a:off x="1008152" y="1754251"/>
+              <a:ext cx="172450" cy="288991"/>
+            </a:xfrm>
+            <a:prstGeom prst="cube">
+              <a:avLst>
+                <a:gd name="adj" fmla="val 15906"/>
+              </a:avLst>
+            </a:prstGeom>
+            <a:solidFill>
+              <a:srgbClr val="FF0000"/>
+            </a:solidFill>
+            <a:ln>
+              <a:noFill/>
+            </a:ln>
+          </p:spPr>
+          <p:style>
+            <a:lnRef idx="2">
+              <a:schemeClr val="accent1">
+                <a:shade val="50000"/>
+              </a:schemeClr>
+            </a:lnRef>
+            <a:fillRef idx="1">
+              <a:schemeClr val="accent1"/>
+            </a:fillRef>
+            <a:effectRef idx="0">
+              <a:schemeClr val="accent1"/>
+            </a:effectRef>
+            <a:fontRef idx="minor">
+              <a:schemeClr val="lt1"/>
+            </a:fontRef>
+          </p:style>
+          <p:txBody>
+            <a:bodyPr rtlCol="0" anchor="ctr"/>
+            <a:lstStyle/>
+            <a:p>
+              <a:pPr algn="ctr"/>
+              <a:endParaRPr lang="en-GB" dirty="0"/>
+            </a:p>
+          </p:txBody>
+        </p:sp>
+        <p:sp>
+          <p:nvSpPr>
+            <p:cNvPr id="60" name="Cube 28"/>
+            <p:cNvSpPr/>
+            <p:nvPr/>
+          </p:nvSpPr>
+          <p:spPr>
+            <a:xfrm>
+              <a:off x="1154750" y="1754775"/>
+              <a:ext cx="172450" cy="288991"/>
+            </a:xfrm>
+            <a:prstGeom prst="cube">
+              <a:avLst>
+                <a:gd name="adj" fmla="val 15906"/>
+              </a:avLst>
+            </a:prstGeom>
+            <a:solidFill>
+              <a:schemeClr val="accent6"/>
+            </a:solidFill>
+            <a:ln>
+              <a:noFill/>
+            </a:ln>
+          </p:spPr>
+          <p:style>
+            <a:lnRef idx="2">
+              <a:schemeClr val="accent1">
+                <a:shade val="50000"/>
+              </a:schemeClr>
+            </a:lnRef>
+            <a:fillRef idx="1">
+              <a:schemeClr val="accent1"/>
+            </a:fillRef>
+            <a:effectRef idx="0">
+              <a:schemeClr val="accent1"/>
+            </a:effectRef>
+            <a:fontRef idx="minor">
+              <a:schemeClr val="lt1"/>
+            </a:fontRef>
+          </p:style>
+          <p:txBody>
+            <a:bodyPr rtlCol="0" anchor="ctr"/>
+            <a:lstStyle/>
+            <a:p>
+              <a:pPr algn="ctr"/>
+              <a:endParaRPr lang="en-GB" dirty="0"/>
+            </a:p>
+          </p:txBody>
+        </p:sp>
+        <p:sp>
+          <p:nvSpPr>
+            <p:cNvPr id="61" name="Cube 27"/>
+            <p:cNvSpPr/>
+            <p:nvPr/>
+          </p:nvSpPr>
+          <p:spPr>
+            <a:xfrm>
+              <a:off x="1296281" y="1754251"/>
+              <a:ext cx="172450" cy="288991"/>
+            </a:xfrm>
+            <a:prstGeom prst="cube">
+              <a:avLst>
+                <a:gd name="adj" fmla="val 15906"/>
+              </a:avLst>
+            </a:prstGeom>
+            <a:solidFill>
+              <a:srgbClr val="FF0000"/>
+            </a:solidFill>
+            <a:ln>
+              <a:noFill/>
+            </a:ln>
+          </p:spPr>
+          <p:style>
+            <a:lnRef idx="2">
+              <a:schemeClr val="accent1">
+                <a:shade val="50000"/>
+              </a:schemeClr>
+            </a:lnRef>
+            <a:fillRef idx="1">
+              <a:schemeClr val="accent1"/>
+            </a:fillRef>
+            <a:effectRef idx="0">
+              <a:schemeClr val="accent1"/>
+            </a:effectRef>
+            <a:fontRef idx="minor">
+              <a:schemeClr val="lt1"/>
+            </a:fontRef>
+          </p:style>
+          <p:txBody>
+            <a:bodyPr rtlCol="0" anchor="ctr"/>
+            <a:lstStyle/>
+            <a:p>
+              <a:pPr algn="ctr"/>
+              <a:endParaRPr lang="en-GB" dirty="0"/>
+            </a:p>
+          </p:txBody>
+        </p:sp>
+        <p:sp>
+          <p:nvSpPr>
+            <p:cNvPr id="62" name="Cube 28"/>
+            <p:cNvSpPr/>
+            <p:nvPr/>
+          </p:nvSpPr>
+          <p:spPr>
+            <a:xfrm>
+              <a:off x="1442879" y="1754775"/>
+              <a:ext cx="172450" cy="288991"/>
+            </a:xfrm>
+            <a:prstGeom prst="cube">
+              <a:avLst>
+                <a:gd name="adj" fmla="val 15906"/>
+              </a:avLst>
+            </a:prstGeom>
+            <a:solidFill>
+              <a:schemeClr val="accent6"/>
+            </a:solidFill>
+            <a:ln>
+              <a:noFill/>
+            </a:ln>
+          </p:spPr>
+          <p:style>
+            <a:lnRef idx="2">
+              <a:schemeClr val="accent1">
+                <a:shade val="50000"/>
+              </a:schemeClr>
+            </a:lnRef>
+            <a:fillRef idx="1">
+              <a:schemeClr val="accent1"/>
+            </a:fillRef>
+            <a:effectRef idx="0">
+              <a:schemeClr val="accent1"/>
+            </a:effectRef>
+            <a:fontRef idx="minor">
+              <a:schemeClr val="lt1"/>
+            </a:fontRef>
+          </p:style>
+          <p:txBody>
+            <a:bodyPr rtlCol="0" anchor="ctr"/>
+            <a:lstStyle/>
+            <a:p>
+              <a:pPr algn="ctr"/>
+              <a:endParaRPr lang="en-GB" dirty="0"/>
+            </a:p>
+          </p:txBody>
+        </p:sp>
+        <p:sp>
+          <p:nvSpPr>
+            <p:cNvPr id="63" name="Cube 27"/>
+            <p:cNvSpPr/>
+            <p:nvPr/>
+          </p:nvSpPr>
+          <p:spPr>
+            <a:xfrm>
+              <a:off x="1584410" y="1754163"/>
+              <a:ext cx="172450" cy="288991"/>
+            </a:xfrm>
+            <a:prstGeom prst="cube">
+              <a:avLst>
+                <a:gd name="adj" fmla="val 15906"/>
+              </a:avLst>
+            </a:prstGeom>
+            <a:solidFill>
+              <a:srgbClr val="FF0000"/>
+            </a:solidFill>
+            <a:ln>
+              <a:noFill/>
+            </a:ln>
+          </p:spPr>
+          <p:style>
+            <a:lnRef idx="2">
+              <a:schemeClr val="accent1">
+                <a:shade val="50000"/>
+              </a:schemeClr>
+            </a:lnRef>
+            <a:fillRef idx="1">
+              <a:schemeClr val="accent1"/>
+            </a:fillRef>
+            <a:effectRef idx="0">
+              <a:schemeClr val="accent1"/>
+            </a:effectRef>
+            <a:fontRef idx="minor">
+              <a:schemeClr val="lt1"/>
+            </a:fontRef>
+          </p:style>
+          <p:txBody>
+            <a:bodyPr rtlCol="0" anchor="ctr"/>
+            <a:lstStyle/>
+            <a:p>
+              <a:pPr algn="ctr"/>
+              <a:endParaRPr lang="en-GB" dirty="0"/>
+            </a:p>
+          </p:txBody>
+        </p:sp>
+      </p:grpSp>
+      <p:grpSp>
+        <p:nvGrpSpPr>
+          <p:cNvPr id="15" name="Grupo 13"/>
+          <p:cNvGrpSpPr/>
+          <p:nvPr/>
+        </p:nvGrpSpPr>
+        <p:grpSpPr>
+          <a:xfrm>
+            <a:off x="2243100" y="2502190"/>
+            <a:ext cx="489773" cy="121787"/>
+            <a:chOff x="286423" y="1753548"/>
+            <a:chExt cx="1470437" cy="290218"/>
+          </a:xfrm>
+        </p:grpSpPr>
+        <p:sp>
+          <p:nvSpPr>
+            <p:cNvPr id="44" name="Cube 26"/>
+            <p:cNvSpPr/>
+            <p:nvPr/>
+          </p:nvSpPr>
+          <p:spPr>
+            <a:xfrm>
+              <a:off x="286423" y="1753548"/>
+              <a:ext cx="172450" cy="288991"/>
+            </a:xfrm>
+            <a:prstGeom prst="cube">
+              <a:avLst>
+                <a:gd name="adj" fmla="val 15906"/>
+              </a:avLst>
+            </a:prstGeom>
+            <a:solidFill>
+              <a:schemeClr val="accent6"/>
+            </a:solidFill>
+            <a:ln>
+              <a:noFill/>
+            </a:ln>
+          </p:spPr>
+          <p:style>
+            <a:lnRef idx="2">
+              <a:schemeClr val="accent1">
+                <a:shade val="50000"/>
+              </a:schemeClr>
+            </a:lnRef>
+            <a:fillRef idx="1">
+              <a:schemeClr val="accent1"/>
+            </a:fillRef>
+            <a:effectRef idx="0">
+              <a:schemeClr val="accent1"/>
+            </a:effectRef>
+            <a:fontRef idx="minor">
+              <a:schemeClr val="lt1"/>
+            </a:fontRef>
+          </p:style>
+          <p:txBody>
+            <a:bodyPr rtlCol="0" anchor="ctr"/>
+            <a:lstStyle/>
+            <a:p>
+              <a:pPr algn="ctr"/>
+              <a:endParaRPr lang="en-GB" dirty="0"/>
+            </a:p>
+          </p:txBody>
+        </p:sp>
+        <p:sp>
+          <p:nvSpPr>
+            <p:cNvPr id="45" name="Cube 27"/>
+            <p:cNvSpPr/>
+            <p:nvPr/>
+          </p:nvSpPr>
+          <p:spPr>
+            <a:xfrm>
+              <a:off x="431887" y="1754250"/>
+              <a:ext cx="172450" cy="288991"/>
+            </a:xfrm>
+            <a:prstGeom prst="cube">
+              <a:avLst>
+                <a:gd name="adj" fmla="val 15906"/>
+              </a:avLst>
+            </a:prstGeom>
+            <a:solidFill>
+              <a:srgbClr val="FF0000"/>
+            </a:solidFill>
+            <a:ln>
+              <a:noFill/>
+            </a:ln>
+          </p:spPr>
+          <p:style>
+            <a:lnRef idx="2">
+              <a:schemeClr val="accent1">
+                <a:shade val="50000"/>
+              </a:schemeClr>
+            </a:lnRef>
+            <a:fillRef idx="1">
+              <a:schemeClr val="accent1"/>
+            </a:fillRef>
+            <a:effectRef idx="0">
+              <a:schemeClr val="accent1"/>
+            </a:effectRef>
+            <a:fontRef idx="minor">
+              <a:schemeClr val="lt1"/>
+            </a:fontRef>
+          </p:style>
+          <p:txBody>
+            <a:bodyPr rtlCol="0" anchor="ctr"/>
+            <a:lstStyle/>
+            <a:p>
+              <a:pPr algn="ctr"/>
+              <a:endParaRPr lang="en-GB" dirty="0"/>
+            </a:p>
+          </p:txBody>
+        </p:sp>
+        <p:sp>
+          <p:nvSpPr>
+            <p:cNvPr id="46" name="Cube 28"/>
+            <p:cNvSpPr/>
+            <p:nvPr/>
+          </p:nvSpPr>
+          <p:spPr>
+            <a:xfrm>
+              <a:off x="578485" y="1754774"/>
+              <a:ext cx="172450" cy="288991"/>
+            </a:xfrm>
+            <a:prstGeom prst="cube">
+              <a:avLst>
+                <a:gd name="adj" fmla="val 15906"/>
+              </a:avLst>
+            </a:prstGeom>
+            <a:solidFill>
+              <a:schemeClr val="accent6"/>
+            </a:solidFill>
+            <a:ln>
+              <a:noFill/>
+            </a:ln>
+          </p:spPr>
+          <p:style>
+            <a:lnRef idx="2">
+              <a:schemeClr val="accent1">
+                <a:shade val="50000"/>
+              </a:schemeClr>
+            </a:lnRef>
+            <a:fillRef idx="1">
+              <a:schemeClr val="accent1"/>
+            </a:fillRef>
+            <a:effectRef idx="0">
+              <a:schemeClr val="accent1"/>
+            </a:effectRef>
+            <a:fontRef idx="minor">
+              <a:schemeClr val="lt1"/>
+            </a:fontRef>
+          </p:style>
+          <p:txBody>
+            <a:bodyPr rtlCol="0" anchor="ctr"/>
+            <a:lstStyle/>
+            <a:p>
+              <a:pPr algn="ctr"/>
+              <a:endParaRPr lang="en-GB" dirty="0"/>
+            </a:p>
+          </p:txBody>
+        </p:sp>
+        <p:sp>
+          <p:nvSpPr>
+            <p:cNvPr id="47" name="Cube 46"/>
+            <p:cNvSpPr/>
+            <p:nvPr/>
+          </p:nvSpPr>
+          <p:spPr>
+            <a:xfrm>
+              <a:off x="720016" y="1754250"/>
+              <a:ext cx="172450" cy="288991"/>
+            </a:xfrm>
+            <a:prstGeom prst="cube">
+              <a:avLst>
+                <a:gd name="adj" fmla="val 15906"/>
+              </a:avLst>
+            </a:prstGeom>
+            <a:solidFill>
+              <a:srgbClr val="FF0000"/>
+            </a:solidFill>
+            <a:ln>
+              <a:noFill/>
+            </a:ln>
+          </p:spPr>
+          <p:style>
+            <a:lnRef idx="2">
+              <a:schemeClr val="accent1">
+                <a:shade val="50000"/>
+              </a:schemeClr>
+            </a:lnRef>
+            <a:fillRef idx="1">
+              <a:schemeClr val="accent1"/>
+            </a:fillRef>
+            <a:effectRef idx="0">
+              <a:schemeClr val="accent1"/>
+            </a:effectRef>
+            <a:fontRef idx="minor">
+              <a:schemeClr val="lt1"/>
+            </a:fontRef>
+          </p:style>
+          <p:txBody>
+            <a:bodyPr rtlCol="0" anchor="ctr"/>
+            <a:lstStyle/>
+            <a:p>
+              <a:pPr algn="ctr"/>
+              <a:endParaRPr lang="en-GB" dirty="0"/>
+            </a:p>
+          </p:txBody>
+        </p:sp>
+        <p:sp>
+          <p:nvSpPr>
+            <p:cNvPr id="48" name="Cube 47"/>
+            <p:cNvSpPr/>
+            <p:nvPr/>
+          </p:nvSpPr>
+          <p:spPr>
+            <a:xfrm>
+              <a:off x="866614" y="1754774"/>
+              <a:ext cx="172450" cy="288991"/>
+            </a:xfrm>
+            <a:prstGeom prst="cube">
+              <a:avLst>
+                <a:gd name="adj" fmla="val 15906"/>
+              </a:avLst>
+            </a:prstGeom>
+            <a:solidFill>
+              <a:schemeClr val="accent6"/>
+            </a:solidFill>
+            <a:ln>
+              <a:noFill/>
+            </a:ln>
+          </p:spPr>
+          <p:style>
+            <a:lnRef idx="2">
+              <a:schemeClr val="accent1">
+                <a:shade val="50000"/>
+              </a:schemeClr>
+            </a:lnRef>
+            <a:fillRef idx="1">
+              <a:schemeClr val="accent1"/>
+            </a:fillRef>
+            <a:effectRef idx="0">
+              <a:schemeClr val="accent1"/>
+            </a:effectRef>
+            <a:fontRef idx="minor">
+              <a:schemeClr val="lt1"/>
+            </a:fontRef>
+          </p:style>
+          <p:txBody>
+            <a:bodyPr rtlCol="0" anchor="ctr"/>
+            <a:lstStyle/>
+            <a:p>
+              <a:pPr algn="ctr"/>
+              <a:endParaRPr lang="en-GB" dirty="0"/>
+            </a:p>
+          </p:txBody>
+        </p:sp>
+        <p:sp>
+          <p:nvSpPr>
+            <p:cNvPr id="49" name="Cube 27"/>
+            <p:cNvSpPr/>
+            <p:nvPr/>
+          </p:nvSpPr>
+          <p:spPr>
+            <a:xfrm>
+              <a:off x="1008152" y="1754251"/>
+              <a:ext cx="172450" cy="288991"/>
+            </a:xfrm>
+            <a:prstGeom prst="cube">
+              <a:avLst>
+                <a:gd name="adj" fmla="val 15906"/>
+              </a:avLst>
+            </a:prstGeom>
+            <a:solidFill>
+              <a:srgbClr val="FF0000"/>
+            </a:solidFill>
+            <a:ln>
+              <a:noFill/>
+            </a:ln>
+          </p:spPr>
+          <p:style>
+            <a:lnRef idx="2">
+              <a:schemeClr val="accent1">
+                <a:shade val="50000"/>
+              </a:schemeClr>
+            </a:lnRef>
+            <a:fillRef idx="1">
+              <a:schemeClr val="accent1"/>
+            </a:fillRef>
+            <a:effectRef idx="0">
+              <a:schemeClr val="accent1"/>
+            </a:effectRef>
+            <a:fontRef idx="minor">
+              <a:schemeClr val="lt1"/>
+            </a:fontRef>
+          </p:style>
+          <p:txBody>
+            <a:bodyPr rtlCol="0" anchor="ctr"/>
+            <a:lstStyle/>
+            <a:p>
+              <a:pPr algn="ctr"/>
+              <a:endParaRPr lang="en-GB" dirty="0"/>
+            </a:p>
+          </p:txBody>
+        </p:sp>
+        <p:sp>
+          <p:nvSpPr>
+            <p:cNvPr id="50" name="Cube 28"/>
+            <p:cNvSpPr/>
+            <p:nvPr/>
+          </p:nvSpPr>
+          <p:spPr>
+            <a:xfrm>
+              <a:off x="1154750" y="1754775"/>
+              <a:ext cx="172450" cy="288991"/>
+            </a:xfrm>
+            <a:prstGeom prst="cube">
+              <a:avLst>
+                <a:gd name="adj" fmla="val 15906"/>
+              </a:avLst>
+            </a:prstGeom>
+            <a:solidFill>
+              <a:schemeClr val="accent6"/>
+            </a:solidFill>
+            <a:ln>
+              <a:noFill/>
+            </a:ln>
+          </p:spPr>
+          <p:style>
+            <a:lnRef idx="2">
+              <a:schemeClr val="accent1">
+                <a:shade val="50000"/>
+              </a:schemeClr>
+            </a:lnRef>
+            <a:fillRef idx="1">
+              <a:schemeClr val="accent1"/>
+            </a:fillRef>
+            <a:effectRef idx="0">
+              <a:schemeClr val="accent1"/>
+            </a:effectRef>
+            <a:fontRef idx="minor">
+              <a:schemeClr val="lt1"/>
+            </a:fontRef>
+          </p:style>
+          <p:txBody>
+            <a:bodyPr rtlCol="0" anchor="ctr"/>
+            <a:lstStyle/>
+            <a:p>
+              <a:pPr algn="ctr"/>
+              <a:endParaRPr lang="en-GB" dirty="0"/>
+            </a:p>
+          </p:txBody>
+        </p:sp>
+        <p:sp>
+          <p:nvSpPr>
+            <p:cNvPr id="51" name="Cube 27"/>
+            <p:cNvSpPr/>
+            <p:nvPr/>
+          </p:nvSpPr>
+          <p:spPr>
+            <a:xfrm>
+              <a:off x="1296281" y="1754251"/>
+              <a:ext cx="172450" cy="288991"/>
+            </a:xfrm>
+            <a:prstGeom prst="cube">
+              <a:avLst>
+                <a:gd name="adj" fmla="val 15906"/>
+              </a:avLst>
+            </a:prstGeom>
+            <a:solidFill>
+              <a:srgbClr val="FF0000"/>
+            </a:solidFill>
+            <a:ln>
+              <a:noFill/>
+            </a:ln>
+          </p:spPr>
+          <p:style>
+            <a:lnRef idx="2">
+              <a:schemeClr val="accent1">
+                <a:shade val="50000"/>
+              </a:schemeClr>
+            </a:lnRef>
+            <a:fillRef idx="1">
+              <a:schemeClr val="accent1"/>
+            </a:fillRef>
+            <a:effectRef idx="0">
+              <a:schemeClr val="accent1"/>
+            </a:effectRef>
+            <a:fontRef idx="minor">
+              <a:schemeClr val="lt1"/>
+            </a:fontRef>
+          </p:style>
+          <p:txBody>
+            <a:bodyPr rtlCol="0" anchor="ctr"/>
+            <a:lstStyle/>
+            <a:p>
+              <a:pPr algn="ctr"/>
+              <a:endParaRPr lang="en-GB" dirty="0"/>
+            </a:p>
+          </p:txBody>
+        </p:sp>
+        <p:sp>
+          <p:nvSpPr>
+            <p:cNvPr id="52" name="Cube 28"/>
+            <p:cNvSpPr/>
+            <p:nvPr/>
+          </p:nvSpPr>
+          <p:spPr>
+            <a:xfrm>
+              <a:off x="1442879" y="1754775"/>
+              <a:ext cx="172450" cy="288991"/>
+            </a:xfrm>
+            <a:prstGeom prst="cube">
+              <a:avLst>
+                <a:gd name="adj" fmla="val 15906"/>
+              </a:avLst>
+            </a:prstGeom>
+            <a:solidFill>
+              <a:schemeClr val="accent6"/>
+            </a:solidFill>
+            <a:ln>
+              <a:noFill/>
+            </a:ln>
+          </p:spPr>
+          <p:style>
+            <a:lnRef idx="2">
+              <a:schemeClr val="accent1">
+                <a:shade val="50000"/>
+              </a:schemeClr>
+            </a:lnRef>
+            <a:fillRef idx="1">
+              <a:schemeClr val="accent1"/>
+            </a:fillRef>
+            <a:effectRef idx="0">
+              <a:schemeClr val="accent1"/>
+            </a:effectRef>
+            <a:fontRef idx="minor">
+              <a:schemeClr val="lt1"/>
+            </a:fontRef>
+          </p:style>
+          <p:txBody>
+            <a:bodyPr rtlCol="0" anchor="ctr"/>
+            <a:lstStyle/>
+            <a:p>
+              <a:pPr algn="ctr"/>
+              <a:endParaRPr lang="en-GB" dirty="0"/>
+            </a:p>
+          </p:txBody>
+        </p:sp>
+        <p:sp>
+          <p:nvSpPr>
+            <p:cNvPr id="53" name="Cube 27"/>
+            <p:cNvSpPr/>
+            <p:nvPr/>
+          </p:nvSpPr>
+          <p:spPr>
+            <a:xfrm>
+              <a:off x="1584410" y="1754163"/>
+              <a:ext cx="172450" cy="288991"/>
+            </a:xfrm>
+            <a:prstGeom prst="cube">
+              <a:avLst>
+                <a:gd name="adj" fmla="val 15906"/>
+              </a:avLst>
+            </a:prstGeom>
+            <a:solidFill>
+              <a:srgbClr val="FF0000"/>
+            </a:solidFill>
+            <a:ln>
+              <a:noFill/>
+            </a:ln>
+          </p:spPr>
+          <p:style>
+            <a:lnRef idx="2">
+              <a:schemeClr val="accent1">
+                <a:shade val="50000"/>
+              </a:schemeClr>
+            </a:lnRef>
+            <a:fillRef idx="1">
+              <a:schemeClr val="accent1"/>
+            </a:fillRef>
+            <a:effectRef idx="0">
+              <a:schemeClr val="accent1"/>
+            </a:effectRef>
+            <a:fontRef idx="minor">
+              <a:schemeClr val="lt1"/>
+            </a:fontRef>
+          </p:style>
+          <p:txBody>
+            <a:bodyPr rtlCol="0" anchor="ctr"/>
+            <a:lstStyle/>
+            <a:p>
+              <a:pPr algn="ctr"/>
+              <a:endParaRPr lang="en-GB" dirty="0"/>
+            </a:p>
+          </p:txBody>
+        </p:sp>
+      </p:grpSp>
+      <p:cxnSp>
+        <p:nvCxnSpPr>
+          <p:cNvPr id="16" name="Straight Connector 15"/>
+          <p:cNvCxnSpPr>
+            <a:cxnSpLocks/>
+          </p:cNvCxnSpPr>
+          <p:nvPr/>
+        </p:nvCxnSpPr>
+        <p:spPr>
+          <a:xfrm>
+            <a:off x="2445544" y="2484522"/>
+            <a:ext cx="3365710" cy="0"/>
+          </a:xfrm>
+          <a:prstGeom prst="line">
+            <a:avLst/>
+          </a:prstGeom>
+          <a:ln>
+            <a:solidFill>
+              <a:schemeClr val="tx1">
+                <a:lumMod val="75000"/>
+                <a:lumOff val="25000"/>
+              </a:schemeClr>
+            </a:solidFill>
+            <a:prstDash val="solid"/>
+          </a:ln>
+        </p:spPr>
+        <p:style>
+          <a:lnRef idx="1">
+            <a:schemeClr val="accent1"/>
+          </a:lnRef>
+          <a:fillRef idx="0">
+            <a:schemeClr val="accent1"/>
+          </a:fillRef>
+          <a:effectRef idx="0">
+            <a:schemeClr val="accent1"/>
+          </a:effectRef>
+          <a:fontRef idx="minor">
+            <a:schemeClr val="tx1"/>
+          </a:fontRef>
+        </p:style>
+      </p:cxnSp>
+      <p:sp>
+        <p:nvSpPr>
+          <p:cNvPr id="17" name="Rectángulo 17"/>
+          <p:cNvSpPr/>
+          <p:nvPr/>
+        </p:nvSpPr>
+        <p:spPr>
+          <a:xfrm>
+            <a:off x="1604374" y="1780131"/>
+            <a:ext cx="1508746" cy="523220"/>
+          </a:xfrm>
+          <a:prstGeom prst="rect">
+            <a:avLst/>
+          </a:prstGeom>
+        </p:spPr>
+        <p:txBody>
+          <a:bodyPr wrap="none">
+            <a:spAutoFit/>
+          </a:bodyPr>
+          <a:lstStyle/>
+          <a:p>
+            <a:r>
+              <a:rPr lang="en-US" sz="1400" b="1" dirty="0"/>
+              <a:t>Source: </a:t>
+            </a:r>
+          </a:p>
+          <a:p>
+            <a:r>
+              <a:rPr lang="en-US" sz="1400" dirty="0"/>
+              <a:t>2.5m CPMU18.6</a:t>
+            </a:r>
+          </a:p>
+        </p:txBody>
+      </p:sp>
+      <p:sp>
+        <p:nvSpPr>
+          <p:cNvPr id="33" name="Cube 32"/>
+          <p:cNvSpPr/>
+          <p:nvPr/>
+        </p:nvSpPr>
+        <p:spPr>
+          <a:xfrm rot="19705693">
+            <a:off x="4694035" y="2371215"/>
+            <a:ext cx="330811" cy="197102"/>
+          </a:xfrm>
+          <a:prstGeom prst="cube">
+            <a:avLst>
+              <a:gd name="adj" fmla="val 10970"/>
+            </a:avLst>
+          </a:prstGeom>
+          <a:solidFill>
+            <a:srgbClr val="FFC000"/>
+          </a:solidFill>
+          <a:ln w="3175">
+            <a:solidFill>
+              <a:schemeClr val="tx1"/>
+            </a:solidFill>
+          </a:ln>
+          <a:scene3d>
+            <a:camera prst="isometricLeftDown"/>
+            <a:lightRig rig="threePt" dir="t"/>
+          </a:scene3d>
+        </p:spPr>
+        <p:style>
+          <a:lnRef idx="2">
+            <a:schemeClr val="accent1">
+              <a:shade val="50000"/>
+            </a:schemeClr>
+          </a:lnRef>
+          <a:fillRef idx="1">
+            <a:schemeClr val="accent1"/>
+          </a:fillRef>
+          <a:effectRef idx="0">
+            <a:schemeClr val="accent1"/>
+          </a:effectRef>
+          <a:fontRef idx="minor">
+            <a:schemeClr val="lt1"/>
+          </a:fontRef>
+        </p:style>
+        <p:txBody>
+          <a:bodyPr rtlCol="0" anchor="ctr"/>
+          <a:lstStyle/>
+          <a:p>
+            <a:pPr algn="ctr"/>
+            <a:endParaRPr lang="en-GB" dirty="0"/>
+          </a:p>
+        </p:txBody>
+      </p:sp>
+      <p:sp>
+        <p:nvSpPr>
+          <p:cNvPr id="34" name="Rectángulo 17"/>
+          <p:cNvSpPr/>
+          <p:nvPr/>
+        </p:nvSpPr>
+        <p:spPr>
+          <a:xfrm>
+            <a:off x="4551892" y="1792709"/>
+            <a:ext cx="1109599" cy="523220"/>
+          </a:xfrm>
+          <a:prstGeom prst="rect">
+            <a:avLst/>
+          </a:prstGeom>
+        </p:spPr>
+        <p:txBody>
+          <a:bodyPr wrap="none">
+            <a:spAutoFit/>
+          </a:bodyPr>
+          <a:lstStyle/>
+          <a:p>
+            <a:r>
+              <a:rPr lang="en-US" sz="1400" b="1" dirty="0"/>
+              <a:t>DMM</a:t>
+            </a:r>
+          </a:p>
+          <a:p>
+            <a:r>
+              <a:rPr lang="en-US" sz="1400" dirty="0"/>
+              <a:t>(Horizontal)</a:t>
+            </a:r>
+          </a:p>
+        </p:txBody>
+      </p:sp>
+      <p:cxnSp>
+        <p:nvCxnSpPr>
+          <p:cNvPr id="42" name="Straight Connector 41"/>
+          <p:cNvCxnSpPr>
+            <a:cxnSpLocks/>
+          </p:cNvCxnSpPr>
+          <p:nvPr/>
+        </p:nvCxnSpPr>
+        <p:spPr>
+          <a:xfrm>
+            <a:off x="5798050" y="2487066"/>
+            <a:ext cx="448005" cy="0"/>
+          </a:xfrm>
+          <a:prstGeom prst="line">
+            <a:avLst/>
+          </a:prstGeom>
+          <a:ln>
+            <a:solidFill>
+              <a:schemeClr val="tx1">
+                <a:lumMod val="75000"/>
+                <a:lumOff val="25000"/>
+              </a:schemeClr>
+            </a:solidFill>
+            <a:prstDash val="solid"/>
+          </a:ln>
+        </p:spPr>
+        <p:style>
+          <a:lnRef idx="1">
+            <a:schemeClr val="accent1"/>
+          </a:lnRef>
+          <a:fillRef idx="0">
+            <a:schemeClr val="accent1"/>
+          </a:fillRef>
+          <a:effectRef idx="0">
+            <a:schemeClr val="accent1"/>
+          </a:effectRef>
+          <a:fontRef idx="minor">
+            <a:schemeClr val="tx1"/>
+          </a:fontRef>
+        </p:style>
+      </p:cxnSp>
+      <p:sp>
+        <p:nvSpPr>
+          <p:cNvPr id="64" name="Rectángulo 17"/>
+          <p:cNvSpPr/>
+          <p:nvPr/>
+        </p:nvSpPr>
+        <p:spPr>
+          <a:xfrm>
+            <a:off x="4691354" y="2640330"/>
+            <a:ext cx="830677" cy="307777"/>
+          </a:xfrm>
+          <a:prstGeom prst="rect">
+            <a:avLst/>
+          </a:prstGeom>
+        </p:spPr>
+        <p:txBody>
+          <a:bodyPr wrap="none">
+            <a:spAutoFit/>
+          </a:bodyPr>
+          <a:lstStyle/>
+          <a:p>
+            <a:r>
+              <a:rPr lang="en-US" sz="1400" dirty="0"/>
+              <a:t>29.54 m</a:t>
+            </a:r>
+          </a:p>
+        </p:txBody>
+      </p:sp>
+    </p:spTree>
+    <p:extLst>
+      <p:ext uri="{BB962C8B-B14F-4D97-AF65-F5344CB8AC3E}">
+        <p14:creationId xmlns:p14="http://schemas.microsoft.com/office/powerpoint/2010/main" val="2479083872"/>
+      </p:ext>
+    </p:extLst>
+  </p:cSld>
+  <p:clrMapOvr>
+    <a:masterClrMapping/>
+  </p:clrMapOvr>
+</p:sld>
+</file>
+
 <file path=ppt/theme/theme1.xml><?xml version="1.0" encoding="utf-8"?>
 <a:theme xmlns:a="http://schemas.openxmlformats.org/drawingml/2006/main" name="ESRF-default">
   <a:themeElements>

</xml_diff>